<commit_message>
hide final slide bookkeeper-multinomial.pptx
</commit_message>
<xml_diff>
--- a/spring13/slides13/bookkeeper-multinomial.pptx
+++ b/spring13/slides13/bookkeeper-multinomial.pptx
@@ -4905,16 +4905,7 @@
                 </a:solidFill>
                 <a:latin typeface="Comic Sans MS" pitchFamily="66" charset="0"/>
               </a:rPr>
-              <a:t>Bookkeeper </a:t>
-            </a:r>
-            <a:r>
-              <a:rPr lang="en-US" sz="6600" b="1" dirty="0" smtClean="0">
-                <a:solidFill>
-                  <a:schemeClr val="tx2"/>
-                </a:solidFill>
-                <a:latin typeface="Comic Sans MS" pitchFamily="66" charset="0"/>
-              </a:rPr>
-              <a:t>Rule </a:t>
+              <a:t>Bookkeeper Rule </a:t>
             </a:r>
             <a:r>
               <a:rPr lang="en-US" sz="6600" b="1" dirty="0" smtClean="0">
@@ -5706,7 +5697,7 @@
           <a:graphicData uri="http://schemas.openxmlformats.org/presentationml/2006/ole">
             <mc:AlternateContent xmlns:mc="http://schemas.openxmlformats.org/markup-compatibility/2006">
               <mc:Choice xmlns:v="urn:schemas-microsoft-com:vml" Requires="v">
-                <p:oleObj spid="_x0000_s134164" name="Equation" r:id="rId4" imgW="545760" imgH="457200" progId="Equation.3">
+                <p:oleObj spid="_x0000_s134166" name="Equation" r:id="rId4" imgW="545760" imgH="457200" progId="Equation.3">
                   <p:embed/>
                 </p:oleObj>
               </mc:Choice>
@@ -6247,7 +6238,7 @@
           <a:graphicData uri="http://schemas.openxmlformats.org/presentationml/2006/ole">
             <mc:AlternateContent xmlns:mc="http://schemas.openxmlformats.org/markup-compatibility/2006">
               <mc:Choice xmlns:v="urn:schemas-microsoft-com:vml" Requires="v">
-                <p:oleObj spid="_x0000_s135209" name="Equation" r:id="rId4" imgW="977900" imgH="266700" progId="Equation.DSMT4">
+                <p:oleObj spid="_x0000_s135212" name="Equation" r:id="rId4" imgW="977900" imgH="266700" progId="Equation.DSMT4">
                   <p:embed/>
                 </p:oleObj>
               </mc:Choice>
@@ -6317,7 +6308,7 @@
           <a:graphicData uri="http://schemas.openxmlformats.org/presentationml/2006/ole">
             <mc:AlternateContent xmlns:mc="http://schemas.openxmlformats.org/markup-compatibility/2006">
               <mc:Choice xmlns:v="urn:schemas-microsoft-com:vml" Requires="v">
-                <p:oleObj spid="_x0000_s135210" name="Equation" r:id="rId6" imgW="965200" imgH="495300" progId="Equation.DSMT4">
+                <p:oleObj spid="_x0000_s135213" name="Equation" r:id="rId6" imgW="965200" imgH="495300" progId="Equation.DSMT4">
                   <p:embed/>
                 </p:oleObj>
               </mc:Choice>
@@ -6934,7 +6925,7 @@
           <a:graphicData uri="http://schemas.openxmlformats.org/presentationml/2006/ole">
             <mc:AlternateContent xmlns:mc="http://schemas.openxmlformats.org/markup-compatibility/2006">
               <mc:Choice xmlns:v="urn:schemas-microsoft-com:vml" Requires="v">
-                <p:oleObj spid="_x0000_s137237" name="Equation" r:id="rId4" imgW="1866900" imgH="469900" progId="Equation.DSMT4">
+                <p:oleObj spid="_x0000_s137240" name="Equation" r:id="rId4" imgW="1866900" imgH="469900" progId="Equation.DSMT4">
                   <p:embed/>
                 </p:oleObj>
               </mc:Choice>
@@ -7034,7 +7025,7 @@
           <a:graphicData uri="http://schemas.openxmlformats.org/presentationml/2006/ole">
             <mc:AlternateContent xmlns:mc="http://schemas.openxmlformats.org/markup-compatibility/2006">
               <mc:Choice xmlns:v="urn:schemas-microsoft-com:vml" Requires="v">
-                <p:oleObj spid="_x0000_s137238" name="Equation" r:id="rId6" imgW="2743200" imgH="609600" progId="Equation.DSMT4">
+                <p:oleObj spid="_x0000_s137241" name="Equation" r:id="rId6" imgW="2743200" imgH="609600" progId="Equation.DSMT4">
                   <p:embed/>
                 </p:oleObj>
               </mc:Choice>
@@ -7244,7 +7235,7 @@
           <a:graphicData uri="http://schemas.openxmlformats.org/presentationml/2006/ole">
             <mc:AlternateContent xmlns:mc="http://schemas.openxmlformats.org/markup-compatibility/2006">
               <mc:Choice xmlns:v="urn:schemas-microsoft-com:vml" Requires="v">
-                <p:oleObj spid="_x0000_s144386" name="Equation" r:id="rId4" imgW="2819400" imgH="1028700" progId="Equation.DSMT4">
+                <p:oleObj spid="_x0000_s144388" name="Equation" r:id="rId4" imgW="2819400" imgH="1028700" progId="Equation.DSMT4">
                   <p:embed/>
                 </p:oleObj>
               </mc:Choice>
@@ -7384,7 +7375,7 @@
           <a:graphicData uri="http://schemas.openxmlformats.org/presentationml/2006/ole">
             <mc:AlternateContent xmlns:mc="http://schemas.openxmlformats.org/markup-compatibility/2006">
               <mc:Choice xmlns:v="urn:schemas-microsoft-com:vml" Requires="v">
-                <p:oleObj spid="_x0000_s136229" name="Equation" r:id="rId4" imgW="1968500" imgH="266700" progId="Equation.DSMT4">
+                <p:oleObj spid="_x0000_s136232" name="Equation" r:id="rId4" imgW="1968500" imgH="266700" progId="Equation.DSMT4">
                   <p:embed/>
                 </p:oleObj>
               </mc:Choice>
@@ -7670,7 +7661,7 @@
           <a:graphicData uri="http://schemas.openxmlformats.org/presentationml/2006/ole">
             <mc:AlternateContent xmlns:mc="http://schemas.openxmlformats.org/markup-compatibility/2006">
               <mc:Choice xmlns:v="urn:schemas-microsoft-com:vml" Requires="v">
-                <p:oleObj spid="_x0000_s136230" name="Equation" r:id="rId6" imgW="965200" imgH="495300" progId="Equation.DSMT4">
+                <p:oleObj spid="_x0000_s136233" name="Equation" r:id="rId6" imgW="965200" imgH="495300" progId="Equation.DSMT4">
                   <p:embed/>
                 </p:oleObj>
               </mc:Choice>
@@ -7825,7 +7816,7 @@
 </file>
 
 <file path=ppt/slides/slide16.xml><?xml version="1.0" encoding="utf-8"?>
-<p:sld xmlns:a="http://schemas.openxmlformats.org/drawingml/2006/main" xmlns:r="http://schemas.openxmlformats.org/officeDocument/2006/relationships" xmlns:p="http://schemas.openxmlformats.org/presentationml/2006/main">
+<p:sld xmlns:a="http://schemas.openxmlformats.org/drawingml/2006/main" xmlns:r="http://schemas.openxmlformats.org/officeDocument/2006/relationships" xmlns:p="http://schemas.openxmlformats.org/presentationml/2006/main" show="0">
   <p:cSld>
     <p:spTree>
       <p:nvGrpSpPr>
@@ -11978,7 +11969,7 @@
           <a:graphicData uri="http://schemas.openxmlformats.org/presentationml/2006/ole">
             <mc:AlternateContent xmlns:mc="http://schemas.openxmlformats.org/markup-compatibility/2006">
               <mc:Choice xmlns:v="urn:schemas-microsoft-com:vml" Requires="v">
-                <p:oleObj spid="_x0000_s139275" name="Equation" r:id="rId4" imgW="495300" imgH="482600" progId="Equation.DSMT4">
+                <p:oleObj spid="_x0000_s139277" name="Equation" r:id="rId4" imgW="495300" imgH="482600" progId="Equation.DSMT4">
                   <p:embed/>
                 </p:oleObj>
               </mc:Choice>
@@ -12862,7 +12853,7 @@
           <a:graphicData uri="http://schemas.openxmlformats.org/presentationml/2006/ole">
             <mc:AlternateContent xmlns:mc="http://schemas.openxmlformats.org/markup-compatibility/2006">
               <mc:Choice xmlns:v="urn:schemas-microsoft-com:vml" Requires="v">
-                <p:oleObj spid="_x0000_s140306" name="Equation" r:id="rId4" imgW="723900" imgH="533400" progId="Equation.3">
+                <p:oleObj spid="_x0000_s140309" name="Equation" r:id="rId4" imgW="723900" imgH="533400" progId="Equation.3">
                   <p:embed/>
                 </p:oleObj>
               </mc:Choice>
@@ -12932,7 +12923,7 @@
           <a:graphicData uri="http://schemas.openxmlformats.org/presentationml/2006/ole">
             <mc:AlternateContent xmlns:mc="http://schemas.openxmlformats.org/markup-compatibility/2006">
               <mc:Choice xmlns:v="urn:schemas-microsoft-com:vml" Requires="v">
-                <p:oleObj spid="_x0000_s140307" name="Equation" r:id="rId6" imgW="1130300" imgH="558800" progId="Equation.3">
+                <p:oleObj spid="_x0000_s140310" name="Equation" r:id="rId6" imgW="1130300" imgH="558800" progId="Equation.3">
                   <p:embed/>
                 </p:oleObj>
               </mc:Choice>
@@ -13444,7 +13435,7 @@
           <a:graphicData uri="http://schemas.openxmlformats.org/presentationml/2006/ole">
             <mc:AlternateContent xmlns:mc="http://schemas.openxmlformats.org/markup-compatibility/2006">
               <mc:Choice xmlns:v="urn:schemas-microsoft-com:vml" Requires="v">
-                <p:oleObj spid="_x0000_s138261" name="Equation" r:id="rId4" imgW="1384300" imgH="546100" progId="Equation.DSMT4">
+                <p:oleObj spid="_x0000_s138263" name="Equation" r:id="rId4" imgW="1384300" imgH="546100" progId="Equation.DSMT4">
                   <p:embed/>
                 </p:oleObj>
               </mc:Choice>
@@ -14795,7 +14786,7 @@
           <a:graphicData uri="http://schemas.openxmlformats.org/presentationml/2006/ole">
             <mc:AlternateContent xmlns:mc="http://schemas.openxmlformats.org/markup-compatibility/2006">
               <mc:Choice xmlns:v="urn:schemas-microsoft-com:vml" Requires="v">
-                <p:oleObj spid="_x0000_s132116" name="Equation" r:id="rId4" imgW="1028700" imgH="571500" progId="Equation.DSMT4">
+                <p:oleObj spid="_x0000_s132118" name="Equation" r:id="rId4" imgW="1028700" imgH="571500" progId="Equation.DSMT4">
                   <p:embed/>
                 </p:oleObj>
               </mc:Choice>
@@ -15188,7 +15179,7 @@
           <a:graphicData uri="http://schemas.openxmlformats.org/presentationml/2006/ole">
             <mc:AlternateContent xmlns:mc="http://schemas.openxmlformats.org/markup-compatibility/2006">
               <mc:Choice xmlns:v="urn:schemas-microsoft-com:vml" Requires="v">
-                <p:oleObj spid="_x0000_s141323" name="Equation" r:id="rId4" imgW="1955800" imgH="571500" progId="Equation.DSMT4">
+                <p:oleObj spid="_x0000_s141325" name="Equation" r:id="rId4" imgW="1955800" imgH="571500" progId="Equation.DSMT4">
                   <p:embed/>
                 </p:oleObj>
               </mc:Choice>
@@ -15436,7 +15427,7 @@
           <a:graphicData uri="http://schemas.openxmlformats.org/presentationml/2006/ole">
             <mc:AlternateContent xmlns:mc="http://schemas.openxmlformats.org/markup-compatibility/2006">
               <mc:Choice xmlns:v="urn:schemas-microsoft-com:vml" Requires="v">
-                <p:oleObj spid="_x0000_s133140" name="Equation" r:id="rId4" imgW="2082800" imgH="622300" progId="Equation.3">
+                <p:oleObj spid="_x0000_s133142" name="Equation" r:id="rId4" imgW="2082800" imgH="622300" progId="Equation.3">
                   <p:embed/>
                 </p:oleObj>
               </mc:Choice>
@@ -15545,13 +15536,13 @@
   <p:clrMapOvr>
     <a:masterClrMapping/>
   </p:clrMapOvr>
-  <mc:AlternateContent xmlns:mc="http://schemas.openxmlformats.org/markup-compatibility/2006" xmlns:p14="http://schemas.microsoft.com/office/powerpoint/2010/main">
-    <mc:Choice Requires="p14">
+  <mc:AlternateContent xmlns:mc="http://schemas.openxmlformats.org/markup-compatibility/2006">
+    <mc:Choice xmlns:p14="http://schemas.microsoft.com/office/powerpoint/2010/main" Requires="p14">
       <p:transition spd="med" p14:dur="700">
         <p:fade/>
       </p:transition>
     </mc:Choice>
-    <mc:Fallback xmlns="">
+    <mc:Fallback>
       <p:transition xmlns:p14="http://schemas.microsoft.com/office/powerpoint/2010/main" spd="med">
         <p:fade/>
       </p:transition>

</xml_diff>